<commit_message>
Advanced RxSwift Day 4
</commit_message>
<xml_diff>
--- a/AdvancedRxSwift/day4/AdvancedRxSwift4.pptx
+++ b/AdvancedRxSwift/day4/AdvancedRxSwift4.pptx
@@ -4031,11 +4031,7 @@
             </a:r>
             <a:r>
               <a:rPr lang="en-US" sz="4400" dirty="0" smtClean="0"/>
-              <a:t> Day </a:t>
-            </a:r>
-            <a:r>
-              <a:rPr lang="en-US" sz="4400" dirty="0" smtClean="0"/>
-              <a:t>4</a:t>
+              <a:t> Day 4</a:t>
             </a:r>
             <a:endParaRPr lang="en" sz="4400" dirty="0"/>
           </a:p>
@@ -4341,7 +4337,6 @@
               <a:rPr lang="en" dirty="0"/>
               <a:t>RxDataSources</a:t>
             </a:r>
-            <a:endParaRPr lang="en" dirty="0"/>
           </a:p>
         </p:txBody>
       </p:sp>
@@ -4655,6 +4650,73 @@
           </a:prstGeom>
         </p:spPr>
       </p:pic>
+      <p:sp>
+        <p:nvSpPr>
+          <p:cNvPr id="3" name="TextBox 2"/>
+          <p:cNvSpPr txBox="1"/>
+          <p:nvPr/>
+        </p:nvSpPr>
+        <p:spPr>
+          <a:xfrm>
+            <a:off x="1347552" y="2149844"/>
+            <a:ext cx="5360421" cy="738664"/>
+          </a:xfrm>
+          <a:prstGeom prst="rect">
+            <a:avLst/>
+          </a:prstGeom>
+          <a:noFill/>
+        </p:spPr>
+        <p:txBody>
+          <a:bodyPr wrap="none" rtlCol="0">
+            <a:spAutoFit/>
+          </a:bodyPr>
+          <a:lstStyle/>
+          <a:p>
+            <a:r>
+              <a:rPr lang="en-US" b="1" i="1" dirty="0">
+                <a:hlinkClick r:id="rId4"/>
+              </a:rPr>
+              <a:t>https://github.com/younghwankim/RxSwiftClass/tree/</a:t>
+            </a:r>
+            <a:r>
+              <a:rPr lang="en-US" b="1" i="1" dirty="0" smtClean="0">
+                <a:hlinkClick r:id="rId4"/>
+              </a:rPr>
+              <a:t>master</a:t>
+            </a:r>
+          </a:p>
+          <a:p>
+            <a:r>
+              <a:rPr lang="en-US" b="1" i="1" dirty="0" smtClean="0">
+                <a:hlinkClick r:id="rId4"/>
+              </a:rPr>
+              <a:t>/</a:t>
+            </a:r>
+            <a:r>
+              <a:rPr lang="en-US" b="1" i="1" dirty="0" err="1">
+                <a:hlinkClick r:id="rId4"/>
+              </a:rPr>
+              <a:t>AdvancedRxSwift</a:t>
+            </a:r>
+            <a:r>
+              <a:rPr lang="en-US" b="1" i="1" dirty="0">
+                <a:hlinkClick r:id="rId4"/>
+              </a:rPr>
+              <a:t>/day4/</a:t>
+            </a:r>
+            <a:r>
+              <a:rPr lang="en-US" b="1" i="1" dirty="0" err="1" smtClean="0">
+                <a:hlinkClick r:id="rId4"/>
+              </a:rPr>
+              <a:t>AdvancedTableView</a:t>
+            </a:r>
+            <a:endParaRPr lang="en-US" b="1" i="1" dirty="0" smtClean="0"/>
+          </a:p>
+          <a:p>
+            <a:endParaRPr lang="en-US" b="1" i="1" dirty="0" smtClean="0"/>
+          </a:p>
+        </p:txBody>
+      </p:sp>
     </p:spTree>
     <p:extLst>
       <p:ext uri="{BB962C8B-B14F-4D97-AF65-F5344CB8AC3E}">
@@ -5249,15 +5311,19 @@
             </a:r>
             <a:r>
               <a:rPr lang="en-US" b="1" dirty="0" smtClean="0"/>
-              <a:t> </a:t>
+              <a:t> Adding </a:t>
+            </a:r>
+            <a:r>
+              <a:rPr lang="en-US" b="1" dirty="0"/>
+              <a:t>a </a:t>
             </a:r>
             <a:r>
               <a:rPr lang="en-US" b="1" dirty="0" smtClean="0"/>
-              <a:t>Adding </a:t>
+              <a:t>Reactive Extension </a:t>
             </a:r>
             <a:r>
               <a:rPr lang="en-US" b="1" dirty="0"/>
-              <a:t>a reactive extension to Custom UI </a:t>
+              <a:t>to Custom UI </a:t>
             </a:r>
             <a:r>
               <a:rPr lang="en-US" b="1" dirty="0" smtClean="0"/>
@@ -5574,7 +5640,6 @@
               <a:rPr lang="en-US" dirty="0" smtClean="0"/>
               <a:t>)</a:t>
             </a:r>
-            <a:endParaRPr lang="en-US" dirty="0" smtClean="0"/>
           </a:p>
         </p:txBody>
       </p:sp>
@@ -6891,7 +6956,7 @@
         </p:nvSpPr>
         <p:spPr>
           <a:xfrm>
-            <a:off x="272617" y="1972903"/>
+            <a:off x="272617" y="1739498"/>
             <a:ext cx="8541258" cy="2308324"/>
           </a:xfrm>
           <a:prstGeom prst="rect">
@@ -7276,42 +7341,6 @@
               <a:t>}</a:t>
             </a:r>
             <a:endParaRPr lang="en-US" sz="1200" b="1" dirty="0" smtClean="0">
-              <a:latin typeface="Courier"/>
-              <a:cs typeface="Courier"/>
-            </a:endParaRPr>
-          </a:p>
-        </p:txBody>
-      </p:sp>
-      <p:sp>
-        <p:nvSpPr>
-          <p:cNvPr id="7" name="TextBox 6"/>
-          <p:cNvSpPr txBox="1"/>
-          <p:nvPr/>
-        </p:nvSpPr>
-        <p:spPr>
-          <a:xfrm>
-            <a:off x="272617" y="1410200"/>
-            <a:ext cx="2677978" cy="307777"/>
-          </a:xfrm>
-          <a:prstGeom prst="rect">
-            <a:avLst/>
-          </a:prstGeom>
-          <a:noFill/>
-        </p:spPr>
-        <p:txBody>
-          <a:bodyPr wrap="square" rtlCol="0">
-            <a:spAutoFit/>
-          </a:bodyPr>
-          <a:lstStyle/>
-          <a:p>
-            <a:r>
-              <a:rPr lang="en-US" b="1" dirty="0" smtClean="0">
-                <a:latin typeface="Courier"/>
-                <a:cs typeface="Courier"/>
-              </a:rPr>
-              <a:t>Custom Implementation</a:t>
-            </a:r>
-            <a:endParaRPr lang="en-US" b="1" dirty="0" smtClean="0">
               <a:latin typeface="Courier"/>
               <a:cs typeface="Courier"/>
             </a:endParaRPr>

</xml_diff>